<commit_message>
update lesson 2 and simplify
</commit_message>
<xml_diff>
--- a/Lessons/B_Intro_to_Analytics/A_IntroToAnalytics.pptx
+++ b/Lessons/B_Intro_to_Analytics/A_IntroToAnalytics.pptx
@@ -238,7 +238,7 @@
           <a:p>
             <a:fld id="{C333ABA6-B72D-4ED4-A6E7-13A0DAE65F1A}" type="datetimeFigureOut">
               <a:rPr lang="en-US" smtClean="0"/>
-              <a:t>2/16/23</a:t>
+              <a:t>1/18/24</a:t>
             </a:fld>
             <a:endParaRPr lang="en-US"/>
           </a:p>
@@ -3577,7 +3577,7 @@
           <a:p>
             <a:fld id="{5738B90E-0779-4C36-915C-6F05FCD89456}" type="datetime1">
               <a:rPr lang="en-US" smtClean="0"/>
-              <a:t>2/16/23</a:t>
+              <a:t>1/18/24</a:t>
             </a:fld>
             <a:endParaRPr lang="en-US"/>
           </a:p>
@@ -3754,7 +3754,7 @@
           <a:p>
             <a:fld id="{7B9EA29D-D431-42FE-B7B6-AAE4454C77D3}" type="datetime1">
               <a:rPr lang="en-US" smtClean="0"/>
-              <a:t>2/16/23</a:t>
+              <a:t>1/18/24</a:t>
             </a:fld>
             <a:endParaRPr lang="en-US"/>
           </a:p>
@@ -3973,7 +3973,7 @@
           <a:p>
             <a:fld id="{690D8A1E-EA8F-46C1-B891-AE0C00D9C314}" type="datetime1">
               <a:rPr lang="en-US" smtClean="0"/>
-              <a:t>2/16/23</a:t>
+              <a:t>1/18/24</a:t>
             </a:fld>
             <a:endParaRPr lang="en-US"/>
           </a:p>
@@ -4226,7 +4226,7 @@
           <a:p>
             <a:fld id="{D753EFC8-4232-4598-94F6-94C0EBAFC469}" type="datetime1">
               <a:rPr lang="en-US" smtClean="0"/>
-              <a:t>2/16/23</a:t>
+              <a:t>1/18/24</a:t>
             </a:fld>
             <a:endParaRPr lang="en-US"/>
           </a:p>
@@ -4500,7 +4500,7 @@
           <a:p>
             <a:fld id="{F3161074-1C18-4AE7-957D-F18524378C85}" type="datetime1">
               <a:rPr lang="en-US" smtClean="0"/>
-              <a:t>2/16/23</a:t>
+              <a:t>1/18/24</a:t>
             </a:fld>
             <a:endParaRPr lang="en-US"/>
           </a:p>
@@ -4733,7 +4733,7 @@
           <a:p>
             <a:fld id="{69BE256C-8D9A-4404-B47D-41A1AE514425}" type="datetime1">
               <a:rPr lang="en-US" smtClean="0"/>
-              <a:t>2/16/23</a:t>
+              <a:t>1/18/24</a:t>
             </a:fld>
             <a:endParaRPr lang="en-US"/>
           </a:p>
@@ -5126,7 +5126,7 @@
           <a:p>
             <a:fld id="{66CB2154-9035-4012-8189-BAAB61C5A5EE}" type="datetime1">
               <a:rPr lang="en-US" smtClean="0"/>
-              <a:t>2/16/23</a:t>
+              <a:t>1/18/24</a:t>
             </a:fld>
             <a:endParaRPr lang="en-US"/>
           </a:p>
@@ -5259,7 +5259,7 @@
           <a:p>
             <a:fld id="{6700A58B-DD98-43D0-B791-721480A02982}" type="datetime1">
               <a:rPr lang="en-US" smtClean="0"/>
-              <a:t>2/16/23</a:t>
+              <a:t>1/18/24</a:t>
             </a:fld>
             <a:endParaRPr lang="en-US"/>
           </a:p>
@@ -5410,7 +5410,7 @@
           <a:p>
             <a:fld id="{7DB6E382-4F61-4E24-BE1A-377EC83D0E3A}" type="datetime1">
               <a:rPr lang="en-US" smtClean="0"/>
-              <a:t>2/16/23</a:t>
+              <a:t>1/18/24</a:t>
             </a:fld>
             <a:endParaRPr lang="en-US"/>
           </a:p>
@@ -5680,7 +5680,7 @@
           <a:p>
             <a:fld id="{4142EED6-FC16-45B9-B8C4-2BC5DBA88325}" type="datetime1">
               <a:rPr lang="en-US" smtClean="0"/>
-              <a:t>2/16/23</a:t>
+              <a:t>1/18/24</a:t>
             </a:fld>
             <a:endParaRPr lang="en-US"/>
           </a:p>
@@ -5957,7 +5957,7 @@
           <a:p>
             <a:fld id="{DF59512B-4F1D-43D7-8819-2F53FEF69650}" type="datetime1">
               <a:rPr lang="en-US" smtClean="0"/>
-              <a:t>2/16/23</a:t>
+              <a:t>1/18/24</a:t>
             </a:fld>
             <a:endParaRPr lang="en-US"/>
           </a:p>
@@ -6192,7 +6192,7 @@
           <a:p>
             <a:fld id="{08437B94-E2BF-44DC-ADC5-B05FC9934E9D}" type="datetime1">
               <a:rPr lang="en-US" smtClean="0"/>
-              <a:t>2/16/23</a:t>
+              <a:t>1/18/24</a:t>
             </a:fld>
             <a:endParaRPr lang="en-US"/>
           </a:p>
@@ -6653,7 +6653,7 @@
           <a:p>
             <a:fld id="{6700A58B-DD98-43D0-B791-721480A02982}" type="datetime1">
               <a:rPr lang="en-US" smtClean="0"/>
-              <a:t>2/16/23</a:t>
+              <a:t>1/18/24</a:t>
             </a:fld>
             <a:endParaRPr lang="en-US"/>
           </a:p>
@@ -6755,7 +6755,7 @@
         <p:spPr>
           <a:xfrm>
             <a:off x="169257" y="1142999"/>
-            <a:ext cx="8704242" cy="461665"/>
+            <a:ext cx="8941487" cy="461665"/>
           </a:xfrm>
           <a:prstGeom prst="rect">
             <a:avLst/>
@@ -6772,7 +6772,7 @@
               <a:rPr lang="en-US" sz="2400" dirty="0">
                 <a:hlinkClick r:id="rId3"/>
               </a:rPr>
-              <a:t>https://github.com/kwartler/Hult_Visualizing-Analyzing-Data-with-R</a:t>
+              <a:t>https://github.com/kwartler/Hult_Visualizing_Analyzing_Data_with_R</a:t>
             </a:r>
             <a:endParaRPr lang="en-US" sz="2400" dirty="0"/>
           </a:p>
@@ -7012,7 +7012,7 @@
           <a:p>
             <a:fld id="{6700A58B-DD98-43D0-B791-721480A02982}" type="datetime1">
               <a:rPr lang="en-US" smtClean="0"/>
-              <a:t>2/16/23</a:t>
+              <a:t>1/18/24</a:t>
             </a:fld>
             <a:endParaRPr lang="en-US"/>
           </a:p>
@@ -7340,7 +7340,7 @@
           <a:p>
             <a:fld id="{6700A58B-DD98-43D0-B791-721480A02982}" type="datetime1">
               <a:rPr lang="en-US" smtClean="0"/>
-              <a:t>2/16/23</a:t>
+              <a:t>1/18/24</a:t>
             </a:fld>
             <a:endParaRPr lang="en-US"/>
           </a:p>
@@ -7634,7 +7634,7 @@
           <a:p>
             <a:fld id="{6700A58B-DD98-43D0-B791-721480A02982}" type="datetime1">
               <a:rPr lang="en-US" smtClean="0"/>
-              <a:t>2/16/23</a:t>
+              <a:t>1/18/24</a:t>
             </a:fld>
             <a:endParaRPr lang="en-US"/>
           </a:p>
@@ -7966,7 +7966,7 @@
           <a:p>
             <a:fld id="{6700A58B-DD98-43D0-B791-721480A02982}" type="datetime1">
               <a:rPr lang="en-US" smtClean="0"/>
-              <a:t>2/16/23</a:t>
+              <a:t>1/18/24</a:t>
             </a:fld>
             <a:endParaRPr lang="en-US"/>
           </a:p>
@@ -8212,7 +8212,7 @@
           <a:p>
             <a:fld id="{6700A58B-DD98-43D0-B791-721480A02982}" type="datetime1">
               <a:rPr lang="en-US" smtClean="0"/>
-              <a:t>2/16/23</a:t>
+              <a:t>1/18/24</a:t>
             </a:fld>
             <a:endParaRPr lang="en-US"/>
           </a:p>
@@ -8376,8 +8376,8 @@
         </p:nvSpPr>
         <p:spPr>
           <a:xfrm>
-            <a:off x="3238205" y="4892124"/>
-            <a:ext cx="5742021" cy="1200329"/>
+            <a:off x="389965" y="4892124"/>
+            <a:ext cx="8590262" cy="1200329"/>
           </a:xfrm>
           <a:prstGeom prst="rect">
             <a:avLst/>
@@ -8387,7 +8387,7 @@
           </a:solidFill>
         </p:spPr>
         <p:txBody>
-          <a:bodyPr wrap="none" rtlCol="0">
+          <a:bodyPr wrap="square" rtlCol="0">
             <a:spAutoFit/>
           </a:bodyPr>
           <a:lstStyle/>
@@ -8497,7 +8497,7 @@
           <a:p>
             <a:fld id="{6700A58B-DD98-43D0-B791-721480A02982}" type="datetime1">
               <a:rPr lang="en-US" smtClean="0"/>
-              <a:t>2/16/23</a:t>
+              <a:t>1/18/24</a:t>
             </a:fld>
             <a:endParaRPr lang="en-US"/>
           </a:p>
@@ -8776,7 +8776,7 @@
           <a:p>
             <a:fld id="{6700A58B-DD98-43D0-B791-721480A02982}" type="datetime1">
               <a:rPr lang="en-US" smtClean="0"/>
-              <a:t>2/16/23</a:t>
+              <a:t>1/18/24</a:t>
             </a:fld>
             <a:endParaRPr lang="en-US"/>
           </a:p>
@@ -9053,7 +9053,7 @@
           <a:p>
             <a:fld id="{6700A58B-DD98-43D0-B791-721480A02982}" type="datetime1">
               <a:rPr lang="en-US" smtClean="0"/>
-              <a:t>2/16/23</a:t>
+              <a:t>1/18/24</a:t>
             </a:fld>
             <a:endParaRPr lang="en-US"/>
           </a:p>
@@ -9382,7 +9382,7 @@
           <a:p>
             <a:fld id="{6700A58B-DD98-43D0-B791-721480A02982}" type="datetime1">
               <a:rPr lang="en-US" smtClean="0"/>
-              <a:t>2/16/23</a:t>
+              <a:t>1/18/24</a:t>
             </a:fld>
             <a:endParaRPr lang="en-US"/>
           </a:p>
@@ -9681,7 +9681,7 @@
           <a:p>
             <a:fld id="{6700A58B-DD98-43D0-B791-721480A02982}" type="datetime1">
               <a:rPr lang="en-US" smtClean="0"/>
-              <a:t>2/16/23</a:t>
+              <a:t>1/18/24</a:t>
             </a:fld>
             <a:endParaRPr lang="en-US"/>
           </a:p>
@@ -10501,7 +10501,7 @@
           <a:p>
             <a:fld id="{9B19E99B-5349-415A-8E56-8E989211A366}" type="datetime1">
               <a:rPr lang="en-US" smtClean="0"/>
-              <a:t>2/16/23</a:t>
+              <a:t>1/18/24</a:t>
             </a:fld>
             <a:endParaRPr lang="en-US"/>
           </a:p>
@@ -10610,7 +10610,7 @@
           <a:p>
             <a:fld id="{6700A58B-DD98-43D0-B791-721480A02982}" type="datetime1">
               <a:rPr lang="en-US" smtClean="0"/>
-              <a:t>2/16/23</a:t>
+              <a:t>1/18/24</a:t>
             </a:fld>
             <a:endParaRPr lang="en-US"/>
           </a:p>
@@ -10982,7 +10982,7 @@
           <a:p>
             <a:fld id="{6700A58B-DD98-43D0-B791-721480A02982}" type="datetime1">
               <a:rPr lang="en-US" smtClean="0"/>
-              <a:t>2/16/23</a:t>
+              <a:t>1/18/24</a:t>
             </a:fld>
             <a:endParaRPr lang="en-US"/>
           </a:p>
@@ -11386,7 +11386,7 @@
           <a:p>
             <a:fld id="{6700A58B-DD98-43D0-B791-721480A02982}" type="datetime1">
               <a:rPr lang="en-US" smtClean="0"/>
-              <a:t>2/16/23</a:t>
+              <a:t>1/18/24</a:t>
             </a:fld>
             <a:endParaRPr lang="en-US"/>
           </a:p>
@@ -12897,7 +12897,7 @@
           <a:p>
             <a:fld id="{6700A58B-DD98-43D0-B791-721480A02982}" type="datetime1">
               <a:rPr lang="en-US" smtClean="0"/>
-              <a:t>2/16/23</a:t>
+              <a:t>1/18/24</a:t>
             </a:fld>
             <a:endParaRPr lang="en-US"/>
           </a:p>
@@ -13309,7 +13309,7 @@
           <a:p>
             <a:fld id="{6700A58B-DD98-43D0-B791-721480A02982}" type="datetime1">
               <a:rPr lang="en-US" smtClean="0"/>
-              <a:t>2/16/23</a:t>
+              <a:t>1/18/24</a:t>
             </a:fld>
             <a:endParaRPr lang="en-US"/>
           </a:p>
@@ -13745,7 +13745,7 @@
           <a:p>
             <a:fld id="{6700A58B-DD98-43D0-B791-721480A02982}" type="datetime1">
               <a:rPr lang="en-US" smtClean="0"/>
-              <a:t>2/16/23</a:t>
+              <a:t>1/18/24</a:t>
             </a:fld>
             <a:endParaRPr lang="en-US"/>
           </a:p>
@@ -14137,7 +14137,7 @@
           <a:p>
             <a:fld id="{6700A58B-DD98-43D0-B791-721480A02982}" type="datetime1">
               <a:rPr lang="en-US" smtClean="0"/>
-              <a:t>2/16/23</a:t>
+              <a:t>1/18/24</a:t>
             </a:fld>
             <a:endParaRPr lang="en-US"/>
           </a:p>
@@ -14525,7 +14525,7 @@
           <a:p>
             <a:fld id="{6700A58B-DD98-43D0-B791-721480A02982}" type="datetime1">
               <a:rPr lang="en-US" smtClean="0"/>
-              <a:t>2/16/23</a:t>
+              <a:t>1/18/24</a:t>
             </a:fld>
             <a:endParaRPr lang="en-US"/>
           </a:p>
@@ -14948,7 +14948,7 @@
           <a:p>
             <a:fld id="{D753EFC8-4232-4598-94F6-94C0EBAFC469}" type="datetime1">
               <a:rPr lang="en-US" smtClean="0"/>
-              <a:t>2/16/23</a:t>
+              <a:t>1/18/24</a:t>
             </a:fld>
             <a:endParaRPr lang="en-US"/>
           </a:p>
@@ -16793,7 +16793,7 @@
           <a:p>
             <a:fld id="{6700A58B-DD98-43D0-B791-721480A02982}" type="datetime1">
               <a:rPr lang="en-US" smtClean="0"/>
-              <a:t>2/16/23</a:t>
+              <a:t>1/18/24</a:t>
             </a:fld>
             <a:endParaRPr lang="en-US"/>
           </a:p>
@@ -17181,7 +17181,7 @@
           <a:p>
             <a:fld id="{6700A58B-DD98-43D0-B791-721480A02982}" type="datetime1">
               <a:rPr lang="en-US" smtClean="0"/>
-              <a:t>2/16/23</a:t>
+              <a:t>1/18/24</a:t>
             </a:fld>
             <a:endParaRPr lang="en-US"/>
           </a:p>
@@ -17469,7 +17469,7 @@
           <a:p>
             <a:fld id="{6700A58B-DD98-43D0-B791-721480A02982}" type="datetime1">
               <a:rPr lang="en-US" smtClean="0"/>
-              <a:t>2/16/23</a:t>
+              <a:t>1/18/24</a:t>
             </a:fld>
             <a:endParaRPr lang="en-US"/>
           </a:p>
@@ -18051,7 +18051,7 @@
           <a:p>
             <a:fld id="{6700A58B-DD98-43D0-B791-721480A02982}" type="datetime1">
               <a:rPr lang="en-US" smtClean="0"/>
-              <a:t>2/16/23</a:t>
+              <a:t>1/18/24</a:t>
             </a:fld>
             <a:endParaRPr lang="en-US"/>
           </a:p>
@@ -18627,7 +18627,7 @@
           <a:p>
             <a:fld id="{6700A58B-DD98-43D0-B791-721480A02982}" type="datetime1">
               <a:rPr lang="en-US" smtClean="0"/>
-              <a:t>2/16/23</a:t>
+              <a:t>1/18/24</a:t>
             </a:fld>
             <a:endParaRPr lang="en-US"/>
           </a:p>
@@ -19203,7 +19203,7 @@
           <a:p>
             <a:fld id="{6700A58B-DD98-43D0-B791-721480A02982}" type="datetime1">
               <a:rPr lang="en-US" smtClean="0"/>
-              <a:t>2/16/23</a:t>
+              <a:t>1/18/24</a:t>
             </a:fld>
             <a:endParaRPr lang="en-US"/>
           </a:p>
@@ -19768,7 +19768,7 @@
           <a:p>
             <a:fld id="{6700A58B-DD98-43D0-B791-721480A02982}" type="datetime1">
               <a:rPr lang="en-US" smtClean="0"/>
-              <a:t>2/16/23</a:t>
+              <a:t>1/18/24</a:t>
             </a:fld>
             <a:endParaRPr lang="en-US"/>
           </a:p>
@@ -20352,7 +20352,7 @@
           <a:p>
             <a:fld id="{6700A58B-DD98-43D0-B791-721480A02982}" type="datetime1">
               <a:rPr lang="en-US" smtClean="0"/>
-              <a:t>2/16/23</a:t>
+              <a:t>1/18/24</a:t>
             </a:fld>
             <a:endParaRPr lang="en-US"/>
           </a:p>
@@ -20928,7 +20928,7 @@
           <a:p>
             <a:fld id="{6700A58B-DD98-43D0-B791-721480A02982}" type="datetime1">
               <a:rPr lang="en-US" smtClean="0"/>
-              <a:t>2/16/23</a:t>
+              <a:t>1/18/24</a:t>
             </a:fld>
             <a:endParaRPr lang="en-US"/>
           </a:p>
@@ -21504,7 +21504,7 @@
           <a:p>
             <a:fld id="{6700A58B-DD98-43D0-B791-721480A02982}" type="datetime1">
               <a:rPr lang="en-US" smtClean="0"/>
-              <a:t>2/16/23</a:t>
+              <a:t>1/18/24</a:t>
             </a:fld>
             <a:endParaRPr lang="en-US"/>
           </a:p>
@@ -22917,7 +22917,7 @@
           <a:p>
             <a:fld id="{9B19E99B-5349-415A-8E56-8E989211A366}" type="datetime1">
               <a:rPr lang="en-US" smtClean="0"/>
-              <a:t>2/16/23</a:t>
+              <a:t>1/18/24</a:t>
             </a:fld>
             <a:endParaRPr lang="en-US"/>
           </a:p>
@@ -23026,7 +23026,7 @@
           <a:p>
             <a:fld id="{6700A58B-DD98-43D0-B791-721480A02982}" type="datetime1">
               <a:rPr lang="en-US" smtClean="0"/>
-              <a:t>2/16/23</a:t>
+              <a:t>1/18/24</a:t>
             </a:fld>
             <a:endParaRPr lang="en-US"/>
           </a:p>
@@ -23411,7 +23411,7 @@
           <a:p>
             <a:fld id="{6700A58B-DD98-43D0-B791-721480A02982}" type="datetime1">
               <a:rPr lang="en-US" smtClean="0"/>
-              <a:t>2/16/23</a:t>
+              <a:t>1/18/24</a:t>
             </a:fld>
             <a:endParaRPr lang="en-US"/>
           </a:p>
@@ -23804,7 +23804,7 @@
           <a:p>
             <a:fld id="{6700A58B-DD98-43D0-B791-721480A02982}" type="datetime1">
               <a:rPr lang="en-US" smtClean="0"/>
-              <a:t>2/16/23</a:t>
+              <a:t>1/18/24</a:t>
             </a:fld>
             <a:endParaRPr lang="en-US"/>
           </a:p>
@@ -24266,7 +24266,7 @@
           <a:p>
             <a:fld id="{6700A58B-DD98-43D0-B791-721480A02982}" type="datetime1">
               <a:rPr lang="en-US" smtClean="0"/>
-              <a:t>2/16/23</a:t>
+              <a:t>1/18/24</a:t>
             </a:fld>
             <a:endParaRPr lang="en-US"/>
           </a:p>
@@ -24751,7 +24751,7 @@
           <a:p>
             <a:fld id="{6700A58B-DD98-43D0-B791-721480A02982}" type="datetime1">
               <a:rPr lang="en-US" smtClean="0"/>
-              <a:t>2/16/23</a:t>
+              <a:t>1/18/24</a:t>
             </a:fld>
             <a:endParaRPr lang="en-US"/>
           </a:p>
@@ -25258,7 +25258,7 @@
           <a:p>
             <a:fld id="{6700A58B-DD98-43D0-B791-721480A02982}" type="datetime1">
               <a:rPr lang="en-US" smtClean="0"/>
-              <a:t>2/16/23</a:t>
+              <a:t>1/18/24</a:t>
             </a:fld>
             <a:endParaRPr lang="en-US"/>
           </a:p>
@@ -25797,7 +25797,7 @@
           <a:p>
             <a:fld id="{6700A58B-DD98-43D0-B791-721480A02982}" type="datetime1">
               <a:rPr lang="en-US" smtClean="0"/>
-              <a:t>2/16/23</a:t>
+              <a:t>1/18/24</a:t>
             </a:fld>
             <a:endParaRPr lang="en-US"/>
           </a:p>
@@ -26431,7 +26431,7 @@
           <a:p>
             <a:fld id="{6700A58B-DD98-43D0-B791-721480A02982}" type="datetime1">
               <a:rPr lang="en-US" smtClean="0"/>
-              <a:t>2/16/23</a:t>
+              <a:t>1/18/24</a:t>
             </a:fld>
             <a:endParaRPr lang="en-US"/>
           </a:p>
@@ -27081,7 +27081,7 @@
           <a:p>
             <a:fld id="{6700A58B-DD98-43D0-B791-721480A02982}" type="datetime1">
               <a:rPr lang="en-US" smtClean="0"/>
-              <a:t>2/16/23</a:t>
+              <a:t>1/18/24</a:t>
             </a:fld>
             <a:endParaRPr lang="en-US"/>
           </a:p>
@@ -27629,7 +27629,7 @@
           <a:p>
             <a:fld id="{6700A58B-DD98-43D0-B791-721480A02982}" type="datetime1">
               <a:rPr lang="en-US" smtClean="0"/>
-              <a:t>2/16/23</a:t>
+              <a:t>1/18/24</a:t>
             </a:fld>
             <a:endParaRPr lang="en-US"/>
           </a:p>

</xml_diff>